<commit_message>
Added has_visited and has_liked methods to the API.
</commit_message>
<xml_diff>
--- a/Documents/Apresentação.pptx
+++ b/Documents/Apresentação.pptx
@@ -9,7 +9,8 @@
     <p:sldId id="257" r:id="rId3"/>
     <p:sldId id="258" r:id="rId4"/>
     <p:sldId id="259" r:id="rId5"/>
-    <p:sldId id="260" r:id="rId6"/>
+    <p:sldId id="262" r:id="rId6"/>
+    <p:sldId id="260" r:id="rId7"/>
   </p:sldIdLst>
   <p:sldSz cx="12192000" cy="6858000"/>
   <p:notesSz cx="6858000" cy="9144000"/>
@@ -2973,64 +2974,36 @@
           <a:chExt cx="0" cy="0"/>
         </a:xfrm>
       </p:grpSpPr>
-      <p:sp>
-        <p:nvSpPr>
-          <p:cNvPr id="2" name="Título 1"/>
-          <p:cNvSpPr>
-            <a:spLocks noGrp="1"/>
-          </p:cNvSpPr>
-          <p:nvPr>
-            <p:ph type="ctrTitle"/>
-          </p:nvPr>
-        </p:nvSpPr>
-        <p:spPr/>
-        <p:txBody>
-          <a:bodyPr/>
-          <a:lstStyle/>
-          <a:p>
-            <a:r>
-              <a:rPr lang="pt-PT" dirty="0" err="1" smtClean="0"/>
-              <a:t>iSee</a:t>
-            </a:r>
-            <a:r>
-              <a:rPr lang="pt-PT" dirty="0" smtClean="0"/>
-              <a:t> Porto</a:t>
-            </a:r>
-            <a:endParaRPr lang="pt-PT" dirty="0"/>
-          </a:p>
-        </p:txBody>
-      </p:sp>
-      <p:sp>
-        <p:nvSpPr>
-          <p:cNvPr id="3" name="Subtítulo 2"/>
-          <p:cNvSpPr>
-            <a:spLocks noGrp="1"/>
-          </p:cNvSpPr>
-          <p:nvPr>
-            <p:ph type="subTitle" idx="1"/>
-          </p:nvPr>
-        </p:nvSpPr>
-        <p:spPr/>
-        <p:txBody>
-          <a:bodyPr/>
-          <a:lstStyle/>
-          <a:p>
-            <a:r>
-              <a:rPr lang="pt-PT" dirty="0" smtClean="0"/>
-              <a:t>(</a:t>
-            </a:r>
-            <a:r>
-              <a:rPr lang="pt-PT" dirty="0" err="1" smtClean="0"/>
-              <a:t>Re</a:t>
-            </a:r>
-            <a:r>
-              <a:rPr lang="pt-PT" dirty="0" smtClean="0"/>
-              <a:t>)Descobrir a Invicta</a:t>
-            </a:r>
-            <a:endParaRPr lang="pt-PT" dirty="0"/>
-          </a:p>
-        </p:txBody>
-      </p:sp>
+      <p:pic>
+        <p:nvPicPr>
+          <p:cNvPr id="12" name="Imagem 11"/>
+          <p:cNvPicPr>
+            <a:picLocks noChangeAspect="1"/>
+          </p:cNvPicPr>
+          <p:nvPr/>
+        </p:nvPicPr>
+        <p:blipFill>
+          <a:blip r:embed="rId2">
+            <a:extLst>
+              <a:ext uri="{28A0092B-C50C-407E-A947-70E740481C1C}">
+                <a14:useLocalDpi xmlns:a14="http://schemas.microsoft.com/office/drawing/2010/main" val="0"/>
+              </a:ext>
+            </a:extLst>
+          </a:blip>
+          <a:stretch>
+            <a:fillRect/>
+          </a:stretch>
+        </p:blipFill>
+        <p:spPr>
+          <a:xfrm>
+            <a:off x="0" y="0"/>
+            <a:ext cx="12192000" cy="6858000"/>
+          </a:xfrm>
+          <a:prstGeom prst="rect">
+            <a:avLst/>
+          </a:prstGeom>
+        </p:spPr>
+      </p:pic>
     </p:spTree>
     <p:extLst>
       <p:ext uri="{BB962C8B-B14F-4D97-AF65-F5344CB8AC3E}">
@@ -3041,6 +3014,13 @@
   <p:clrMapOvr>
     <a:masterClrMapping/>
   </p:clrMapOvr>
+  <p:timing>
+    <p:tnLst>
+      <p:par>
+        <p:cTn id="1" dur="indefinite" restart="never" nodeType="tmRoot"/>
+      </p:par>
+    </p:tnLst>
+  </p:timing>
 </p:sld>
 </file>
 
@@ -3061,6 +3041,36 @@
           <a:chExt cx="0" cy="0"/>
         </a:xfrm>
       </p:grpSpPr>
+      <p:pic>
+        <p:nvPicPr>
+          <p:cNvPr id="6" name="Imagem 5"/>
+          <p:cNvPicPr>
+            <a:picLocks noChangeAspect="1"/>
+          </p:cNvPicPr>
+          <p:nvPr/>
+        </p:nvPicPr>
+        <p:blipFill>
+          <a:blip r:embed="rId2">
+            <a:extLst>
+              <a:ext uri="{28A0092B-C50C-407E-A947-70E740481C1C}">
+                <a14:useLocalDpi xmlns:a14="http://schemas.microsoft.com/office/drawing/2010/main" val="0"/>
+              </a:ext>
+            </a:extLst>
+          </a:blip>
+          <a:stretch>
+            <a:fillRect/>
+          </a:stretch>
+        </p:blipFill>
+        <p:spPr>
+          <a:xfrm>
+            <a:off x="0" y="0"/>
+            <a:ext cx="12192000" cy="6858000"/>
+          </a:xfrm>
+          <a:prstGeom prst="rect">
+            <a:avLst/>
+          </a:prstGeom>
+        </p:spPr>
+      </p:pic>
       <p:sp>
         <p:nvSpPr>
           <p:cNvPr id="2" name="Título 1"/>
@@ -3071,56 +3081,124 @@
             <p:ph type="title"/>
           </p:nvPr>
         </p:nvSpPr>
+        <p:spPr>
+          <a:xfrm>
+            <a:off x="838200" y="299221"/>
+            <a:ext cx="10515600" cy="1325563"/>
+          </a:xfrm>
+        </p:spPr>
+        <p:txBody>
+          <a:bodyPr/>
+          <a:lstStyle/>
+          <a:p>
+            <a:pPr algn="r"/>
+            <a:r>
+              <a:rPr lang="pt-PT" b="1" dirty="0" smtClean="0">
+                <a:latin typeface="Kozuka Gothic Pr6N B" panose="020B0800000000000000" pitchFamily="34" charset="-128"/>
+                <a:ea typeface="Kozuka Gothic Pr6N B" panose="020B0800000000000000" pitchFamily="34" charset="-128"/>
+              </a:rPr>
+              <a:t>Contextualização</a:t>
+            </a:r>
+            <a:endParaRPr lang="pt-PT" b="1" dirty="0">
+              <a:latin typeface="Kozuka Gothic Pr6N B" panose="020B0800000000000000" pitchFamily="34" charset="-128"/>
+              <a:ea typeface="Kozuka Gothic Pr6N B" panose="020B0800000000000000" pitchFamily="34" charset="-128"/>
+            </a:endParaRPr>
+          </a:p>
+        </p:txBody>
+      </p:sp>
+      <p:sp>
+        <p:nvSpPr>
+          <p:cNvPr id="3" name="Marcador de Posição de Conteúdo 2"/>
+          <p:cNvSpPr>
+            <a:spLocks noGrp="1"/>
+          </p:cNvSpPr>
+          <p:nvPr>
+            <p:ph idx="1"/>
+          </p:nvPr>
+        </p:nvSpPr>
         <p:spPr/>
         <p:txBody>
           <a:bodyPr/>
           <a:lstStyle/>
           <a:p>
-            <a:r>
-              <a:rPr lang="pt-PT" dirty="0" smtClean="0"/>
-              <a:t>Contextualização</a:t>
-            </a:r>
-            <a:endParaRPr lang="pt-PT" dirty="0"/>
-          </a:p>
-        </p:txBody>
-      </p:sp>
-      <p:sp>
-        <p:nvSpPr>
-          <p:cNvPr id="3" name="Marcador de Posição de Conteúdo 2"/>
-          <p:cNvSpPr>
-            <a:spLocks noGrp="1"/>
-          </p:cNvSpPr>
-          <p:nvPr>
-            <p:ph idx="1"/>
-          </p:nvPr>
-        </p:nvSpPr>
-        <p:spPr/>
-        <p:txBody>
-          <a:bodyPr/>
-          <a:lstStyle/>
-          <a:p>
-            <a:r>
-              <a:rPr lang="pt-PT" dirty="0" smtClean="0"/>
-              <a:t>Interação social através das aplicações móveis é cada vez maior;</a:t>
-            </a:r>
-          </a:p>
-          <a:p>
-            <a:r>
-              <a:rPr lang="pt-PT" dirty="0" smtClean="0"/>
-              <a:t>Muitos pontos de interesse que não aparecem nos roteiros estão “esquecidos”;</a:t>
-            </a:r>
-          </a:p>
-          <a:p>
-            <a:r>
-              <a:rPr lang="pt-PT" dirty="0" smtClean="0"/>
-              <a:t>As aplicações desta categoria não têm em conta o fator “amigo”;</a:t>
-            </a:r>
-          </a:p>
-          <a:p>
-            <a:r>
-              <a:rPr lang="pt-PT" dirty="0" smtClean="0"/>
-              <a:t>Necessidade de criar uma aplicação mais pessoal;</a:t>
-            </a:r>
+            <a:pPr>
+              <a:lnSpc>
+                <a:spcPct val="200000"/>
+              </a:lnSpc>
+              <a:buFont typeface="Wingdings" panose="05000000000000000000" pitchFamily="2" charset="2"/>
+              <a:buChar char="§"/>
+            </a:pPr>
+            <a:r>
+              <a:rPr lang="pt-PT" dirty="0" smtClean="0">
+                <a:latin typeface="Kozuka Gothic Pro R" panose="020B0400000000000000" pitchFamily="34" charset="-128"/>
+                <a:ea typeface="Kozuka Gothic Pro R" panose="020B0400000000000000" pitchFamily="34" charset="-128"/>
+              </a:rPr>
+              <a:t>Grande interação social usando aplicações móveis;</a:t>
+            </a:r>
+            <a:endParaRPr lang="pt-PT" dirty="0" smtClean="0">
+              <a:latin typeface="Kozuka Gothic Pro R" panose="020B0400000000000000" pitchFamily="34" charset="-128"/>
+              <a:ea typeface="Kozuka Gothic Pro R" panose="020B0400000000000000" pitchFamily="34" charset="-128"/>
+            </a:endParaRPr>
+          </a:p>
+          <a:p>
+            <a:pPr>
+              <a:lnSpc>
+                <a:spcPct val="200000"/>
+              </a:lnSpc>
+              <a:buFont typeface="Wingdings" panose="05000000000000000000" pitchFamily="2" charset="2"/>
+              <a:buChar char="§"/>
+            </a:pPr>
+            <a:r>
+              <a:rPr lang="pt-PT" dirty="0" smtClean="0">
+                <a:latin typeface="Kozuka Gothic Pro R" panose="020B0400000000000000" pitchFamily="34" charset="-128"/>
+                <a:ea typeface="Kozuka Gothic Pro R" panose="020B0400000000000000" pitchFamily="34" charset="-128"/>
+              </a:rPr>
+              <a:t>Pontos de interesse não presentes em roteiros;</a:t>
+            </a:r>
+            <a:endParaRPr lang="pt-PT" dirty="0" smtClean="0">
+              <a:latin typeface="Kozuka Gothic Pro R" panose="020B0400000000000000" pitchFamily="34" charset="-128"/>
+              <a:ea typeface="Kozuka Gothic Pro R" panose="020B0400000000000000" pitchFamily="34" charset="-128"/>
+            </a:endParaRPr>
+          </a:p>
+          <a:p>
+            <a:pPr>
+              <a:lnSpc>
+                <a:spcPct val="200000"/>
+              </a:lnSpc>
+              <a:buFont typeface="Wingdings" panose="05000000000000000000" pitchFamily="2" charset="2"/>
+              <a:buChar char="§"/>
+            </a:pPr>
+            <a:r>
+              <a:rPr lang="pt-PT" dirty="0" smtClean="0">
+                <a:latin typeface="Kozuka Gothic Pro R" panose="020B0400000000000000" pitchFamily="34" charset="-128"/>
+                <a:ea typeface="Kozuka Gothic Pro R" panose="020B0400000000000000" pitchFamily="34" charset="-128"/>
+              </a:rPr>
+              <a:t>Aplicações com sugestões não baseadas nos amigos;</a:t>
+            </a:r>
+            <a:endParaRPr lang="pt-PT" dirty="0" smtClean="0">
+              <a:latin typeface="Kozuka Gothic Pro R" panose="020B0400000000000000" pitchFamily="34" charset="-128"/>
+              <a:ea typeface="Kozuka Gothic Pro R" panose="020B0400000000000000" pitchFamily="34" charset="-128"/>
+            </a:endParaRPr>
+          </a:p>
+          <a:p>
+            <a:pPr>
+              <a:lnSpc>
+                <a:spcPct val="200000"/>
+              </a:lnSpc>
+              <a:buFont typeface="Wingdings" panose="05000000000000000000" pitchFamily="2" charset="2"/>
+              <a:buChar char="§"/>
+            </a:pPr>
+            <a:r>
+              <a:rPr lang="pt-PT" dirty="0" smtClean="0">
+                <a:latin typeface="Kozuka Gothic Pro R" panose="020B0400000000000000" pitchFamily="34" charset="-128"/>
+                <a:ea typeface="Kozuka Gothic Pro R" panose="020B0400000000000000" pitchFamily="34" charset="-128"/>
+              </a:rPr>
+              <a:t>Inexistência de aplicações com caráter pessoal.</a:t>
+            </a:r>
+            <a:endParaRPr lang="pt-PT" dirty="0" smtClean="0">
+              <a:latin typeface="Kozuka Gothic Pro R" panose="020B0400000000000000" pitchFamily="34" charset="-128"/>
+              <a:ea typeface="Kozuka Gothic Pro R" panose="020B0400000000000000" pitchFamily="34" charset="-128"/>
+            </a:endParaRPr>
           </a:p>
         </p:txBody>
       </p:sp>
@@ -3134,6 +3212,13 @@
   <p:clrMapOvr>
     <a:masterClrMapping/>
   </p:clrMapOvr>
+  <p:timing>
+    <p:tnLst>
+      <p:par>
+        <p:cTn id="1" dur="indefinite" restart="never" nodeType="tmRoot"/>
+      </p:par>
+    </p:tnLst>
+  </p:timing>
 </p:sld>
 </file>
 
@@ -3154,73 +3239,210 @@
           <a:chExt cx="0" cy="0"/>
         </a:xfrm>
       </p:grpSpPr>
-      <p:sp>
-        <p:nvSpPr>
-          <p:cNvPr id="2" name="Título 1"/>
-          <p:cNvSpPr>
-            <a:spLocks noGrp="1"/>
-          </p:cNvSpPr>
-          <p:nvPr>
-            <p:ph type="title"/>
+      <p:pic>
+        <p:nvPicPr>
+          <p:cNvPr id="4" name="Imagem 3"/>
+          <p:cNvPicPr>
+            <a:picLocks noChangeAspect="1"/>
+          </p:cNvPicPr>
+          <p:nvPr/>
+        </p:nvPicPr>
+        <p:blipFill>
+          <a:blip r:embed="rId2">
+            <a:extLst>
+              <a:ext uri="{28A0092B-C50C-407E-A947-70E740481C1C}">
+                <a14:useLocalDpi xmlns:a14="http://schemas.microsoft.com/office/drawing/2010/main" val="0"/>
+              </a:ext>
+            </a:extLst>
+          </a:blip>
+          <a:stretch>
+            <a:fillRect/>
+          </a:stretch>
+        </p:blipFill>
+        <p:spPr>
+          <a:xfrm>
+            <a:off x="0" y="0"/>
+            <a:ext cx="12192000" cy="6858000"/>
+          </a:xfrm>
+          <a:prstGeom prst="rect">
+            <a:avLst/>
+          </a:prstGeom>
+        </p:spPr>
+      </p:pic>
+      <p:sp>
+        <p:nvSpPr>
+          <p:cNvPr id="3" name="Marcador de Posição de Conteúdo 2"/>
+          <p:cNvSpPr>
+            <a:spLocks noGrp="1"/>
+          </p:cNvSpPr>
+          <p:nvPr>
+            <p:ph idx="1"/>
           </p:nvPr>
         </p:nvSpPr>
         <p:spPr/>
         <p:txBody>
-          <a:bodyPr/>
-          <a:lstStyle/>
-          <a:p>
-            <a:r>
-              <a:rPr lang="pt-PT" dirty="0" smtClean="0"/>
+          <a:bodyPr>
+            <a:noAutofit/>
+          </a:bodyPr>
+          <a:lstStyle/>
+          <a:p>
+            <a:pPr>
+              <a:lnSpc>
+                <a:spcPct val="200000"/>
+              </a:lnSpc>
+              <a:buFont typeface="Wingdings" panose="05000000000000000000" pitchFamily="2" charset="2"/>
+              <a:buChar char="§"/>
+            </a:pPr>
+            <a:r>
+              <a:rPr lang="pt-PT" dirty="0" smtClean="0">
+                <a:latin typeface="Kozuka Gothic Pro R" panose="020B0400000000000000" pitchFamily="34" charset="-128"/>
+                <a:ea typeface="Kozuka Gothic Pro R" panose="020B0400000000000000" pitchFamily="34" charset="-128"/>
+              </a:rPr>
+              <a:t>(</a:t>
+            </a:r>
+            <a:r>
+              <a:rPr lang="pt-PT" dirty="0" err="1" smtClean="0">
+                <a:latin typeface="Kozuka Gothic Pro R" panose="020B0400000000000000" pitchFamily="34" charset="-128"/>
+                <a:ea typeface="Kozuka Gothic Pro R" panose="020B0400000000000000" pitchFamily="34" charset="-128"/>
+              </a:rPr>
+              <a:t>Re</a:t>
+            </a:r>
+            <a:r>
+              <a:rPr lang="pt-PT" dirty="0" smtClean="0">
+                <a:latin typeface="Kozuka Gothic Pro R" panose="020B0400000000000000" pitchFamily="34" charset="-128"/>
+                <a:ea typeface="Kozuka Gothic Pro R" panose="020B0400000000000000" pitchFamily="34" charset="-128"/>
+              </a:rPr>
+              <a:t>)Descobrir </a:t>
+            </a:r>
+            <a:r>
+              <a:rPr lang="pt-PT" dirty="0" smtClean="0">
+                <a:latin typeface="Kozuka Gothic Pro R" panose="020B0400000000000000" pitchFamily="34" charset="-128"/>
+                <a:ea typeface="Kozuka Gothic Pro R" panose="020B0400000000000000" pitchFamily="34" charset="-128"/>
+              </a:rPr>
+              <a:t>a Invicta;</a:t>
+            </a:r>
+          </a:p>
+          <a:p>
+            <a:pPr>
+              <a:lnSpc>
+                <a:spcPct val="200000"/>
+              </a:lnSpc>
+              <a:buFont typeface="Wingdings" panose="05000000000000000000" pitchFamily="2" charset="2"/>
+              <a:buChar char="§"/>
+            </a:pPr>
+            <a:r>
+              <a:rPr lang="pt-PT" dirty="0" smtClean="0">
+                <a:latin typeface="Kozuka Gothic Pro R" panose="020B0400000000000000" pitchFamily="34" charset="-128"/>
+                <a:ea typeface="Kozuka Gothic Pro R" panose="020B0400000000000000" pitchFamily="34" charset="-128"/>
+              </a:rPr>
+              <a:t>Partilhar pontos de interesse com os amigos;</a:t>
+            </a:r>
+          </a:p>
+          <a:p>
+            <a:pPr>
+              <a:lnSpc>
+                <a:spcPct val="200000"/>
+              </a:lnSpc>
+              <a:buFont typeface="Wingdings" panose="05000000000000000000" pitchFamily="2" charset="2"/>
+              <a:buChar char="§"/>
+            </a:pPr>
+            <a:r>
+              <a:rPr lang="pt-PT" dirty="0" smtClean="0">
+                <a:latin typeface="Kozuka Gothic Pro R" panose="020B0400000000000000" pitchFamily="34" charset="-128"/>
+                <a:ea typeface="Kozuka Gothic Pro R" panose="020B0400000000000000" pitchFamily="34" charset="-128"/>
+              </a:rPr>
+              <a:t>Estar a par dos locais visitados recentemente por eles;</a:t>
+            </a:r>
+          </a:p>
+          <a:p>
+            <a:pPr>
+              <a:lnSpc>
+                <a:spcPct val="200000"/>
+              </a:lnSpc>
+              <a:buFont typeface="Wingdings" panose="05000000000000000000" pitchFamily="2" charset="2"/>
+              <a:buChar char="§"/>
+            </a:pPr>
+            <a:r>
+              <a:rPr lang="pt-PT" dirty="0" smtClean="0">
+                <a:latin typeface="Kozuka Gothic Pro R" panose="020B0400000000000000" pitchFamily="34" charset="-128"/>
+                <a:ea typeface="Kozuka Gothic Pro R" panose="020B0400000000000000" pitchFamily="34" charset="-128"/>
+              </a:rPr>
+              <a:t>Dar a conhecer novos pontos de interesse baseado no </a:t>
+            </a:r>
+            <a:r>
+              <a:rPr lang="pt-PT" dirty="0" err="1" smtClean="0">
+                <a:latin typeface="Kozuka Gothic Pro R" panose="020B0400000000000000" pitchFamily="34" charset="-128"/>
+                <a:ea typeface="Kozuka Gothic Pro R" panose="020B0400000000000000" pitchFamily="34" charset="-128"/>
+              </a:rPr>
+              <a:t>rank</a:t>
+            </a:r>
+            <a:r>
+              <a:rPr lang="pt-PT" dirty="0" smtClean="0">
+                <a:latin typeface="Kozuka Gothic Pro R" panose="020B0400000000000000" pitchFamily="34" charset="-128"/>
+                <a:ea typeface="Kozuka Gothic Pro R" panose="020B0400000000000000" pitchFamily="34" charset="-128"/>
+              </a:rPr>
+              <a:t>.</a:t>
+            </a:r>
+            <a:endParaRPr lang="pt-PT" dirty="0">
+              <a:latin typeface="Kozuka Gothic Pro R" panose="020B0400000000000000" pitchFamily="34" charset="-128"/>
+              <a:ea typeface="Kozuka Gothic Pro R" panose="020B0400000000000000" pitchFamily="34" charset="-128"/>
+            </a:endParaRPr>
+          </a:p>
+        </p:txBody>
+      </p:sp>
+      <p:sp>
+        <p:nvSpPr>
+          <p:cNvPr id="6" name="Título 1"/>
+          <p:cNvSpPr txBox="1">
+            <a:spLocks/>
+          </p:cNvSpPr>
+          <p:nvPr/>
+        </p:nvSpPr>
+        <p:spPr>
+          <a:xfrm>
+            <a:off x="838200" y="299221"/>
+            <a:ext cx="10515600" cy="1325563"/>
+          </a:xfrm>
+          <a:prstGeom prst="rect">
+            <a:avLst/>
+          </a:prstGeom>
+        </p:spPr>
+        <p:txBody>
+          <a:bodyPr vert="horz" lIns="91440" tIns="45720" rIns="91440" bIns="45720" rtlCol="0" anchor="ctr">
+            <a:normAutofit/>
+          </a:bodyPr>
+          <a:lstStyle>
+            <a:lvl1pPr algn="l" defTabSz="914400" rtl="0" eaLnBrk="1" latinLnBrk="0" hangingPunct="1">
+              <a:lnSpc>
+                <a:spcPct val="90000"/>
+              </a:lnSpc>
+              <a:spcBef>
+                <a:spcPct val="0"/>
+              </a:spcBef>
+              <a:buNone/>
+              <a:defRPr sz="4400" kern="1200">
+                <a:solidFill>
+                  <a:schemeClr val="tx1"/>
+                </a:solidFill>
+                <a:latin typeface="+mj-lt"/>
+                <a:ea typeface="+mj-ea"/>
+                <a:cs typeface="+mj-cs"/>
+              </a:defRPr>
+            </a:lvl1pPr>
+          </a:lstStyle>
+          <a:p>
+            <a:pPr algn="r"/>
+            <a:r>
+              <a:rPr lang="pt-PT" b="1" dirty="0" smtClean="0">
+                <a:latin typeface="Kozuka Gothic Pr6N B" panose="020B0800000000000000" pitchFamily="34" charset="-128"/>
+                <a:ea typeface="Kozuka Gothic Pr6N B" panose="020B0800000000000000" pitchFamily="34" charset="-128"/>
+              </a:rPr>
               <a:t>Objetivo</a:t>
             </a:r>
-            <a:endParaRPr lang="pt-PT" dirty="0"/>
-          </a:p>
-        </p:txBody>
-      </p:sp>
-      <p:sp>
-        <p:nvSpPr>
-          <p:cNvPr id="3" name="Marcador de Posição de Conteúdo 2"/>
-          <p:cNvSpPr>
-            <a:spLocks noGrp="1"/>
-          </p:cNvSpPr>
-          <p:nvPr>
-            <p:ph idx="1"/>
-          </p:nvPr>
-        </p:nvSpPr>
-        <p:spPr/>
-        <p:txBody>
-          <a:bodyPr/>
-          <a:lstStyle/>
-          <a:p>
-            <a:r>
-              <a:rPr lang="pt-PT" dirty="0" smtClean="0"/>
-              <a:t>(</a:t>
-            </a:r>
-            <a:r>
-              <a:rPr lang="pt-PT" dirty="0" err="1" smtClean="0"/>
-              <a:t>Re</a:t>
-            </a:r>
-            <a:r>
-              <a:rPr lang="pt-PT" dirty="0" smtClean="0"/>
-              <a:t>)Descobrir a Invicta;</a:t>
-            </a:r>
-          </a:p>
-          <a:p>
-            <a:r>
-              <a:rPr lang="pt-PT" dirty="0" smtClean="0"/>
-              <a:t>Partilhar pontos de interesse com os amigos;</a:t>
-            </a:r>
-          </a:p>
-          <a:p>
-            <a:r>
-              <a:rPr lang="pt-PT" dirty="0" smtClean="0"/>
-              <a:t>Estar a par dos locais visitados recentemente </a:t>
-            </a:r>
-            <a:r>
-              <a:rPr lang="pt-PT" dirty="0" smtClean="0"/>
-              <a:t>por eles;</a:t>
-            </a:r>
-            <a:endParaRPr lang="pt-PT" dirty="0"/>
+            <a:endParaRPr lang="pt-PT" b="1" dirty="0">
+              <a:latin typeface="Kozuka Gothic Pr6N B" panose="020B0800000000000000" pitchFamily="34" charset="-128"/>
+              <a:ea typeface="Kozuka Gothic Pr6N B" panose="020B0800000000000000" pitchFamily="34" charset="-128"/>
+            </a:endParaRPr>
           </a:p>
         </p:txBody>
       </p:sp>
@@ -3234,6 +3456,13 @@
   <p:clrMapOvr>
     <a:masterClrMapping/>
   </p:clrMapOvr>
+  <p:timing>
+    <p:tnLst>
+      <p:par>
+        <p:cTn id="1" dur="indefinite" restart="never" nodeType="tmRoot"/>
+      </p:par>
+    </p:tnLst>
+  </p:timing>
 </p:sld>
 </file>
 
@@ -3254,145 +3483,406 @@
           <a:chExt cx="0" cy="0"/>
         </a:xfrm>
       </p:grpSpPr>
-      <p:sp>
-        <p:nvSpPr>
-          <p:cNvPr id="2" name="Título 1"/>
-          <p:cNvSpPr>
-            <a:spLocks noGrp="1"/>
-          </p:cNvSpPr>
-          <p:nvPr>
-            <p:ph type="title"/>
+      <p:pic>
+        <p:nvPicPr>
+          <p:cNvPr id="4" name="Imagem 3"/>
+          <p:cNvPicPr>
+            <a:picLocks noChangeAspect="1"/>
+          </p:cNvPicPr>
+          <p:nvPr/>
+        </p:nvPicPr>
+        <p:blipFill>
+          <a:blip r:embed="rId2">
+            <a:extLst>
+              <a:ext uri="{28A0092B-C50C-407E-A947-70E740481C1C}">
+                <a14:useLocalDpi xmlns:a14="http://schemas.microsoft.com/office/drawing/2010/main" val="0"/>
+              </a:ext>
+            </a:extLst>
+          </a:blip>
+          <a:stretch>
+            <a:fillRect/>
+          </a:stretch>
+        </p:blipFill>
+        <p:spPr>
+          <a:xfrm>
+            <a:off x="0" y="0"/>
+            <a:ext cx="12192000" cy="6858000"/>
+          </a:xfrm>
+          <a:prstGeom prst="rect">
+            <a:avLst/>
+          </a:prstGeom>
+        </p:spPr>
+      </p:pic>
+      <p:sp>
+        <p:nvSpPr>
+          <p:cNvPr id="3" name="Marcador de Posição de Conteúdo 2"/>
+          <p:cNvSpPr>
+            <a:spLocks noGrp="1"/>
+          </p:cNvSpPr>
+          <p:nvPr>
+            <p:ph idx="1"/>
           </p:nvPr>
         </p:nvSpPr>
         <p:spPr/>
         <p:txBody>
-          <a:bodyPr/>
-          <a:lstStyle/>
-          <a:p>
-            <a:r>
-              <a:rPr lang="pt-PT" dirty="0" smtClean="0"/>
+          <a:bodyPr>
+            <a:noAutofit/>
+          </a:bodyPr>
+          <a:lstStyle/>
+          <a:p>
+            <a:pPr>
+              <a:lnSpc>
+                <a:spcPct val="200000"/>
+              </a:lnSpc>
+              <a:buFont typeface="Wingdings" panose="05000000000000000000" pitchFamily="2" charset="2"/>
+              <a:buChar char="§"/>
+            </a:pPr>
+            <a:r>
+              <a:rPr lang="pt-PT" dirty="0" smtClean="0">
+                <a:latin typeface="Kozuka Gothic Pro R" panose="020B0400000000000000" pitchFamily="34" charset="-128"/>
+                <a:ea typeface="Kozuka Gothic Pro R" panose="020B0400000000000000" pitchFamily="34" charset="-128"/>
+              </a:rPr>
+              <a:t>Criar novos pontos de interesse;</a:t>
+            </a:r>
+          </a:p>
+          <a:p>
+            <a:pPr>
+              <a:lnSpc>
+                <a:spcPct val="200000"/>
+              </a:lnSpc>
+              <a:buFont typeface="Wingdings" panose="05000000000000000000" pitchFamily="2" charset="2"/>
+              <a:buChar char="§"/>
+            </a:pPr>
+            <a:r>
+              <a:rPr lang="pt-PT" dirty="0" smtClean="0">
+                <a:latin typeface="Kozuka Gothic Pro R" panose="020B0400000000000000" pitchFamily="34" charset="-128"/>
+                <a:ea typeface="Kozuka Gothic Pro R" panose="020B0400000000000000" pitchFamily="34" charset="-128"/>
+              </a:rPr>
+              <a:t>API em PHP para executar diversas ações;</a:t>
+            </a:r>
+          </a:p>
+          <a:p>
+            <a:pPr>
+              <a:lnSpc>
+                <a:spcPct val="200000"/>
+              </a:lnSpc>
+              <a:buFont typeface="Wingdings" panose="05000000000000000000" pitchFamily="2" charset="2"/>
+              <a:buChar char="§"/>
+            </a:pPr>
+            <a:r>
+              <a:rPr lang="pt-PT" dirty="0">
+                <a:latin typeface="Kozuka Gothic Pro R" panose="020B0400000000000000" pitchFamily="34" charset="-128"/>
+                <a:ea typeface="Kozuka Gothic Pro R" panose="020B0400000000000000" pitchFamily="34" charset="-128"/>
+              </a:rPr>
+              <a:t>Geração do código QR do ponto de interesse</a:t>
+            </a:r>
+            <a:r>
+              <a:rPr lang="pt-PT" dirty="0" smtClean="0">
+                <a:latin typeface="Kozuka Gothic Pro R" panose="020B0400000000000000" pitchFamily="34" charset="-128"/>
+                <a:ea typeface="Kozuka Gothic Pro R" panose="020B0400000000000000" pitchFamily="34" charset="-128"/>
+              </a:rPr>
+              <a:t>;</a:t>
+            </a:r>
+            <a:endParaRPr lang="pt-PT" dirty="0">
+              <a:latin typeface="Kozuka Gothic Pro R" panose="020B0400000000000000" pitchFamily="34" charset="-128"/>
+              <a:ea typeface="Kozuka Gothic Pro R" panose="020B0400000000000000" pitchFamily="34" charset="-128"/>
+            </a:endParaRPr>
+          </a:p>
+          <a:p>
+            <a:pPr>
+              <a:lnSpc>
+                <a:spcPct val="200000"/>
+              </a:lnSpc>
+              <a:buFont typeface="Wingdings" panose="05000000000000000000" pitchFamily="2" charset="2"/>
+              <a:buChar char="§"/>
+            </a:pPr>
+            <a:r>
+              <a:rPr lang="pt-PT" dirty="0" smtClean="0">
+                <a:latin typeface="Kozuka Gothic Pro R" panose="020B0400000000000000" pitchFamily="34" charset="-128"/>
+                <a:ea typeface="Kozuka Gothic Pro R" panose="020B0400000000000000" pitchFamily="34" charset="-128"/>
+              </a:rPr>
+              <a:t>Encriptação da ligação através de uma conexão SSL.</a:t>
+            </a:r>
+            <a:endParaRPr lang="pt-PT" dirty="0">
+              <a:latin typeface="Kozuka Gothic Pro R" panose="020B0400000000000000" pitchFamily="34" charset="-128"/>
+              <a:ea typeface="Kozuka Gothic Pro R" panose="020B0400000000000000" pitchFamily="34" charset="-128"/>
+            </a:endParaRPr>
+          </a:p>
+          <a:p>
+            <a:pPr>
+              <a:lnSpc>
+                <a:spcPct val="200000"/>
+              </a:lnSpc>
+              <a:buFont typeface="Wingdings" panose="05000000000000000000" pitchFamily="2" charset="2"/>
+              <a:buChar char="§"/>
+            </a:pPr>
+            <a:endParaRPr lang="pt-PT" dirty="0" smtClean="0">
+              <a:latin typeface="Kozuka Gothic Pro R" panose="020B0400000000000000" pitchFamily="34" charset="-128"/>
+              <a:ea typeface="Kozuka Gothic Pro R" panose="020B0400000000000000" pitchFamily="34" charset="-128"/>
+            </a:endParaRPr>
+          </a:p>
+        </p:txBody>
+      </p:sp>
+      <p:sp>
+        <p:nvSpPr>
+          <p:cNvPr id="5" name="Título 1"/>
+          <p:cNvSpPr txBox="1">
+            <a:spLocks/>
+          </p:cNvSpPr>
+          <p:nvPr/>
+        </p:nvSpPr>
+        <p:spPr>
+          <a:xfrm>
+            <a:off x="838200" y="299221"/>
+            <a:ext cx="10515600" cy="1325563"/>
+          </a:xfrm>
+          <a:prstGeom prst="rect">
+            <a:avLst/>
+          </a:prstGeom>
+        </p:spPr>
+        <p:txBody>
+          <a:bodyPr vert="horz" lIns="91440" tIns="45720" rIns="91440" bIns="45720" rtlCol="0" anchor="ctr">
+            <a:normAutofit/>
+          </a:bodyPr>
+          <a:lstStyle>
+            <a:lvl1pPr algn="l" defTabSz="914400" rtl="0" eaLnBrk="1" latinLnBrk="0" hangingPunct="1">
+              <a:lnSpc>
+                <a:spcPct val="90000"/>
+              </a:lnSpc>
+              <a:spcBef>
+                <a:spcPct val="0"/>
+              </a:spcBef>
+              <a:buNone/>
+              <a:defRPr sz="4400" kern="1200">
+                <a:solidFill>
+                  <a:schemeClr val="tx1"/>
+                </a:solidFill>
+                <a:latin typeface="+mj-lt"/>
+                <a:ea typeface="+mj-ea"/>
+                <a:cs typeface="+mj-cs"/>
+              </a:defRPr>
+            </a:lvl1pPr>
+          </a:lstStyle>
+          <a:p>
+            <a:pPr algn="r"/>
+            <a:r>
+              <a:rPr lang="pt-PT" b="1" dirty="0" smtClean="0">
+                <a:latin typeface="Kozuka Gothic Pr6N B" panose="020B0800000000000000" pitchFamily="34" charset="-128"/>
+                <a:ea typeface="Kozuka Gothic Pr6N B" panose="020B0800000000000000" pitchFamily="34" charset="-128"/>
+              </a:rPr>
               <a:t>Funcionalidades</a:t>
             </a:r>
-            <a:endParaRPr lang="pt-PT" dirty="0"/>
-          </a:p>
-        </p:txBody>
-      </p:sp>
-      <p:sp>
-        <p:nvSpPr>
-          <p:cNvPr id="3" name="Marcador de Posição de Conteúdo 2"/>
-          <p:cNvSpPr>
-            <a:spLocks noGrp="1"/>
-          </p:cNvSpPr>
-          <p:nvPr>
-            <p:ph idx="1"/>
-          </p:nvPr>
-        </p:nvSpPr>
-        <p:spPr/>
-        <p:txBody>
-          <a:bodyPr>
-            <a:normAutofit fontScale="92500" lnSpcReduction="10000"/>
+            <a:endParaRPr lang="pt-PT" b="1" dirty="0">
+              <a:latin typeface="Kozuka Gothic Pr6N B" panose="020B0800000000000000" pitchFamily="34" charset="-128"/>
+              <a:ea typeface="Kozuka Gothic Pr6N B" panose="020B0800000000000000" pitchFamily="34" charset="-128"/>
+            </a:endParaRPr>
+          </a:p>
+        </p:txBody>
+      </p:sp>
+      <p:sp>
+        <p:nvSpPr>
+          <p:cNvPr id="8" name="Marcador de Posição de Conteúdo 2"/>
+          <p:cNvSpPr txBox="1">
+            <a:spLocks/>
+          </p:cNvSpPr>
+          <p:nvPr/>
+        </p:nvSpPr>
+        <p:spPr>
+          <a:xfrm>
+            <a:off x="838200" y="1063625"/>
+            <a:ext cx="1855573" cy="1111164"/>
+          </a:xfrm>
+          <a:prstGeom prst="rect">
+            <a:avLst/>
+          </a:prstGeom>
+        </p:spPr>
+        <p:txBody>
+          <a:bodyPr vert="horz" lIns="91440" tIns="45720" rIns="91440" bIns="45720" rtlCol="0">
+            <a:noAutofit/>
           </a:bodyPr>
-          <a:lstStyle/>
-          <a:p>
-            <a:r>
-              <a:rPr lang="pt-PT" dirty="0" smtClean="0"/>
-              <a:t>Criar novos pontos de interesse;</a:t>
-            </a:r>
-          </a:p>
-          <a:p>
-            <a:r>
-              <a:rPr lang="pt-PT" dirty="0" smtClean="0"/>
-              <a:t>Sistema de conquistas na aplicação;</a:t>
-            </a:r>
-          </a:p>
-          <a:p>
-            <a:r>
-              <a:rPr lang="pt-PT" dirty="0" err="1" smtClean="0"/>
-              <a:t>Feed</a:t>
-            </a:r>
-            <a:r>
-              <a:rPr lang="pt-PT" dirty="0" smtClean="0"/>
-              <a:t> de últimos locais visitados pelos amigos;</a:t>
-            </a:r>
-          </a:p>
-          <a:p>
-            <a:r>
-              <a:rPr lang="pt-PT" dirty="0" smtClean="0"/>
-              <a:t>Integração </a:t>
-            </a:r>
-            <a:r>
-              <a:rPr lang="pt-PT" dirty="0" smtClean="0"/>
-              <a:t>com </a:t>
-            </a:r>
-            <a:r>
-              <a:rPr lang="pt-PT" dirty="0" smtClean="0"/>
-              <a:t>o </a:t>
-            </a:r>
-            <a:r>
-              <a:rPr lang="pt-PT" dirty="0" err="1" smtClean="0"/>
-              <a:t>Facebook</a:t>
-            </a:r>
-            <a:r>
-              <a:rPr lang="pt-PT" dirty="0" smtClean="0"/>
-              <a:t>;</a:t>
-            </a:r>
-          </a:p>
-          <a:p>
-            <a:r>
-              <a:rPr lang="pt-PT" dirty="0" smtClean="0"/>
-              <a:t>Geração do código QR do </a:t>
-            </a:r>
-            <a:r>
-              <a:rPr lang="pt-PT" dirty="0" smtClean="0"/>
-              <a:t>ponto de interesse;</a:t>
-            </a:r>
-            <a:endParaRPr lang="pt-PT" dirty="0" smtClean="0"/>
-          </a:p>
-          <a:p>
-            <a:r>
-              <a:rPr lang="pt-PT" dirty="0" smtClean="0"/>
-              <a:t>Aceder às informações de um local pelo seu código QR;</a:t>
-            </a:r>
-          </a:p>
-          <a:p>
-            <a:r>
-              <a:rPr lang="pt-PT" dirty="0" smtClean="0"/>
-              <a:t>Integração da interface web com a aplicação </a:t>
-            </a:r>
-            <a:r>
-              <a:rPr lang="pt-PT" dirty="0" err="1" smtClean="0"/>
-              <a:t>Android</a:t>
-            </a:r>
-            <a:r>
-              <a:rPr lang="pt-PT" dirty="0" smtClean="0"/>
-              <a:t> através de </a:t>
-            </a:r>
-            <a:r>
-              <a:rPr lang="pt-PT" dirty="0" smtClean="0"/>
-              <a:t>uma </a:t>
-            </a:r>
-            <a:r>
-              <a:rPr lang="pt-PT" b="1" dirty="0" smtClean="0">
+          <a:lstStyle>
+            <a:lvl1pPr marL="228600" indent="-228600" algn="l" defTabSz="914400" rtl="0" eaLnBrk="1" latinLnBrk="0" hangingPunct="1">
+              <a:lnSpc>
+                <a:spcPct val="90000"/>
+              </a:lnSpc>
+              <a:spcBef>
+                <a:spcPts val="1000"/>
+              </a:spcBef>
+              <a:buFont typeface="Arial" panose="020B0604020202020204" pitchFamily="34" charset="0"/>
+              <a:buChar char="•"/>
+              <a:defRPr sz="2800" kern="1200">
                 <a:solidFill>
-                  <a:srgbClr val="FF0000"/>
+                  <a:schemeClr val="tx1"/>
                 </a:solidFill>
+                <a:latin typeface="+mn-lt"/>
+                <a:ea typeface="+mn-ea"/>
+                <a:cs typeface="+mn-cs"/>
+              </a:defRPr>
+            </a:lvl1pPr>
+            <a:lvl2pPr marL="685800" indent="-228600" algn="l" defTabSz="914400" rtl="0" eaLnBrk="1" latinLnBrk="0" hangingPunct="1">
+              <a:lnSpc>
+                <a:spcPct val="90000"/>
+              </a:lnSpc>
+              <a:spcBef>
+                <a:spcPts val="500"/>
+              </a:spcBef>
+              <a:buFont typeface="Arial" panose="020B0604020202020204" pitchFamily="34" charset="0"/>
+              <a:buChar char="•"/>
+              <a:defRPr sz="2400" kern="1200">
+                <a:solidFill>
+                  <a:schemeClr val="tx1"/>
+                </a:solidFill>
+                <a:latin typeface="+mn-lt"/>
+                <a:ea typeface="+mn-ea"/>
+                <a:cs typeface="+mn-cs"/>
+              </a:defRPr>
+            </a:lvl2pPr>
+            <a:lvl3pPr marL="1143000" indent="-228600" algn="l" defTabSz="914400" rtl="0" eaLnBrk="1" latinLnBrk="0" hangingPunct="1">
+              <a:lnSpc>
+                <a:spcPct val="90000"/>
+              </a:lnSpc>
+              <a:spcBef>
+                <a:spcPts val="500"/>
+              </a:spcBef>
+              <a:buFont typeface="Arial" panose="020B0604020202020204" pitchFamily="34" charset="0"/>
+              <a:buChar char="•"/>
+              <a:defRPr sz="2000" kern="1200">
+                <a:solidFill>
+                  <a:schemeClr val="tx1"/>
+                </a:solidFill>
+                <a:latin typeface="+mn-lt"/>
+                <a:ea typeface="+mn-ea"/>
+                <a:cs typeface="+mn-cs"/>
+              </a:defRPr>
+            </a:lvl3pPr>
+            <a:lvl4pPr marL="1600200" indent="-228600" algn="l" defTabSz="914400" rtl="0" eaLnBrk="1" latinLnBrk="0" hangingPunct="1">
+              <a:lnSpc>
+                <a:spcPct val="90000"/>
+              </a:lnSpc>
+              <a:spcBef>
+                <a:spcPts val="500"/>
+              </a:spcBef>
+              <a:buFont typeface="Arial" panose="020B0604020202020204" pitchFamily="34" charset="0"/>
+              <a:buChar char="•"/>
+              <a:defRPr sz="1800" kern="1200">
+                <a:solidFill>
+                  <a:schemeClr val="tx1"/>
+                </a:solidFill>
+                <a:latin typeface="+mn-lt"/>
+                <a:ea typeface="+mn-ea"/>
+                <a:cs typeface="+mn-cs"/>
+              </a:defRPr>
+            </a:lvl4pPr>
+            <a:lvl5pPr marL="2057400" indent="-228600" algn="l" defTabSz="914400" rtl="0" eaLnBrk="1" latinLnBrk="0" hangingPunct="1">
+              <a:lnSpc>
+                <a:spcPct val="90000"/>
+              </a:lnSpc>
+              <a:spcBef>
+                <a:spcPts val="500"/>
+              </a:spcBef>
+              <a:buFont typeface="Arial" panose="020B0604020202020204" pitchFamily="34" charset="0"/>
+              <a:buChar char="•"/>
+              <a:defRPr sz="1800" kern="1200">
+                <a:solidFill>
+                  <a:schemeClr val="tx1"/>
+                </a:solidFill>
+                <a:latin typeface="+mn-lt"/>
+                <a:ea typeface="+mn-ea"/>
+                <a:cs typeface="+mn-cs"/>
+              </a:defRPr>
+            </a:lvl5pPr>
+            <a:lvl6pPr marL="2514600" indent="-228600" algn="l" defTabSz="914400" rtl="0" eaLnBrk="1" latinLnBrk="0" hangingPunct="1">
+              <a:lnSpc>
+                <a:spcPct val="90000"/>
+              </a:lnSpc>
+              <a:spcBef>
+                <a:spcPts val="500"/>
+              </a:spcBef>
+              <a:buFont typeface="Arial" panose="020B0604020202020204" pitchFamily="34" charset="0"/>
+              <a:buChar char="•"/>
+              <a:defRPr sz="1800" kern="1200">
+                <a:solidFill>
+                  <a:schemeClr val="tx1"/>
+                </a:solidFill>
+                <a:latin typeface="+mn-lt"/>
+                <a:ea typeface="+mn-ea"/>
+                <a:cs typeface="+mn-cs"/>
+              </a:defRPr>
+            </a:lvl6pPr>
+            <a:lvl7pPr marL="2971800" indent="-228600" algn="l" defTabSz="914400" rtl="0" eaLnBrk="1" latinLnBrk="0" hangingPunct="1">
+              <a:lnSpc>
+                <a:spcPct val="90000"/>
+              </a:lnSpc>
+              <a:spcBef>
+                <a:spcPts val="500"/>
+              </a:spcBef>
+              <a:buFont typeface="Arial" panose="020B0604020202020204" pitchFamily="34" charset="0"/>
+              <a:buChar char="•"/>
+              <a:defRPr sz="1800" kern="1200">
+                <a:solidFill>
+                  <a:schemeClr val="tx1"/>
+                </a:solidFill>
+                <a:latin typeface="+mn-lt"/>
+                <a:ea typeface="+mn-ea"/>
+                <a:cs typeface="+mn-cs"/>
+              </a:defRPr>
+            </a:lvl7pPr>
+            <a:lvl8pPr marL="3429000" indent="-228600" algn="l" defTabSz="914400" rtl="0" eaLnBrk="1" latinLnBrk="0" hangingPunct="1">
+              <a:lnSpc>
+                <a:spcPct val="90000"/>
+              </a:lnSpc>
+              <a:spcBef>
+                <a:spcPts val="500"/>
+              </a:spcBef>
+              <a:buFont typeface="Arial" panose="020B0604020202020204" pitchFamily="34" charset="0"/>
+              <a:buChar char="•"/>
+              <a:defRPr sz="1800" kern="1200">
+                <a:solidFill>
+                  <a:schemeClr val="tx1"/>
+                </a:solidFill>
+                <a:latin typeface="+mn-lt"/>
+                <a:ea typeface="+mn-ea"/>
+                <a:cs typeface="+mn-cs"/>
+              </a:defRPr>
+            </a:lvl8pPr>
+            <a:lvl9pPr marL="3886200" indent="-228600" algn="l" defTabSz="914400" rtl="0" eaLnBrk="1" latinLnBrk="0" hangingPunct="1">
+              <a:lnSpc>
+                <a:spcPct val="90000"/>
+              </a:lnSpc>
+              <a:spcBef>
+                <a:spcPts val="500"/>
+              </a:spcBef>
+              <a:buFont typeface="Arial" panose="020B0604020202020204" pitchFamily="34" charset="0"/>
+              <a:buChar char="•"/>
+              <a:defRPr sz="1800" kern="1200">
+                <a:solidFill>
+                  <a:schemeClr val="tx1"/>
+                </a:solidFill>
+                <a:latin typeface="+mn-lt"/>
+                <a:ea typeface="+mn-ea"/>
+                <a:cs typeface="+mn-cs"/>
+              </a:defRPr>
+            </a:lvl9pPr>
+          </a:lstStyle>
+          <a:p>
+            <a:pPr marL="0" indent="0">
+              <a:lnSpc>
+                <a:spcPct val="200000"/>
+              </a:lnSpc>
+              <a:buFont typeface="Arial" panose="020B0604020202020204" pitchFamily="34" charset="0"/>
+              <a:buNone/>
+            </a:pPr>
+            <a:r>
+              <a:rPr lang="pt-PT" sz="3200" b="1" dirty="0" smtClean="0">
+                <a:latin typeface="Kozuka Gothic Pro R" panose="020B0400000000000000" pitchFamily="34" charset="-128"/>
+                <a:ea typeface="Kozuka Gothic Pro R" panose="020B0400000000000000" pitchFamily="34" charset="-128"/>
               </a:rPr>
-              <a:t>********* </a:t>
-            </a:r>
-            <a:r>
-              <a:rPr lang="pt-PT" dirty="0" smtClean="0"/>
-              <a:t>API</a:t>
-            </a:r>
-            <a:r>
-              <a:rPr lang="pt-PT" dirty="0" smtClean="0"/>
-              <a:t>.</a:t>
-            </a:r>
-          </a:p>
-          <a:p>
-            <a:r>
-              <a:rPr lang="pt-PT" dirty="0" smtClean="0"/>
-              <a:t>Encriptação da ligação entre o utilizador e o website através de uma ligação SSL.</a:t>
-            </a:r>
+              <a:t>WEBSITE</a:t>
+            </a:r>
+            <a:endParaRPr lang="pt-PT" dirty="0" smtClean="0">
+              <a:latin typeface="Kozuka Gothic Pro R" panose="020B0400000000000000" pitchFamily="34" charset="-128"/>
+              <a:ea typeface="Kozuka Gothic Pro R" panose="020B0400000000000000" pitchFamily="34" charset="-128"/>
+            </a:endParaRPr>
           </a:p>
         </p:txBody>
       </p:sp>
@@ -3406,6 +3896,13 @@
   <p:clrMapOvr>
     <a:masterClrMapping/>
   </p:clrMapOvr>
+  <p:timing>
+    <p:tnLst>
+      <p:par>
+        <p:cTn id="1" dur="indefinite" restart="never" nodeType="tmRoot"/>
+      </p:par>
+    </p:tnLst>
+  </p:timing>
 </p:sld>
 </file>
 
@@ -3426,53 +3923,656 @@
           <a:chExt cx="0" cy="0"/>
         </a:xfrm>
       </p:grpSpPr>
-      <p:sp>
-        <p:nvSpPr>
-          <p:cNvPr id="2" name="Título 1"/>
-          <p:cNvSpPr>
-            <a:spLocks noGrp="1"/>
-          </p:cNvSpPr>
-          <p:nvPr>
-            <p:ph type="title"/>
+      <p:pic>
+        <p:nvPicPr>
+          <p:cNvPr id="4" name="Imagem 3"/>
+          <p:cNvPicPr>
+            <a:picLocks noChangeAspect="1"/>
+          </p:cNvPicPr>
+          <p:nvPr/>
+        </p:nvPicPr>
+        <p:blipFill>
+          <a:blip r:embed="rId2">
+            <a:extLst>
+              <a:ext uri="{28A0092B-C50C-407E-A947-70E740481C1C}">
+                <a14:useLocalDpi xmlns:a14="http://schemas.microsoft.com/office/drawing/2010/main" val="0"/>
+              </a:ext>
+            </a:extLst>
+          </a:blip>
+          <a:stretch>
+            <a:fillRect/>
+          </a:stretch>
+        </p:blipFill>
+        <p:spPr>
+          <a:xfrm>
+            <a:off x="0" y="0"/>
+            <a:ext cx="12192000" cy="6858000"/>
+          </a:xfrm>
+          <a:prstGeom prst="rect">
+            <a:avLst/>
+          </a:prstGeom>
+        </p:spPr>
+      </p:pic>
+      <p:sp>
+        <p:nvSpPr>
+          <p:cNvPr id="3" name="Marcador de Posição de Conteúdo 2"/>
+          <p:cNvSpPr>
+            <a:spLocks noGrp="1"/>
+          </p:cNvSpPr>
+          <p:nvPr>
+            <p:ph idx="1"/>
           </p:nvPr>
         </p:nvSpPr>
         <p:spPr/>
         <p:txBody>
-          <a:bodyPr/>
-          <a:lstStyle/>
-          <a:p>
-            <a:r>
-              <a:rPr lang="pt-PT" dirty="0" smtClean="0"/>
+          <a:bodyPr>
+            <a:noAutofit/>
+          </a:bodyPr>
+          <a:lstStyle/>
+          <a:p>
+            <a:pPr>
+              <a:lnSpc>
+                <a:spcPct val="200000"/>
+              </a:lnSpc>
+              <a:buFont typeface="Wingdings" panose="05000000000000000000" pitchFamily="2" charset="2"/>
+              <a:buChar char="§"/>
+            </a:pPr>
+            <a:r>
+              <a:rPr lang="pt-PT" dirty="0" smtClean="0">
+                <a:latin typeface="Kozuka Gothic Pro R" panose="020B0400000000000000" pitchFamily="34" charset="-128"/>
+                <a:ea typeface="Kozuka Gothic Pro R" panose="020B0400000000000000" pitchFamily="34" charset="-128"/>
+              </a:rPr>
+              <a:t>Sistema </a:t>
+            </a:r>
+            <a:r>
+              <a:rPr lang="pt-PT" dirty="0">
+                <a:latin typeface="Kozuka Gothic Pro R" panose="020B0400000000000000" pitchFamily="34" charset="-128"/>
+                <a:ea typeface="Kozuka Gothic Pro R" panose="020B0400000000000000" pitchFamily="34" charset="-128"/>
+              </a:rPr>
+              <a:t>de conquistas na aplicação;</a:t>
+            </a:r>
+          </a:p>
+          <a:p>
+            <a:pPr>
+              <a:lnSpc>
+                <a:spcPct val="200000"/>
+              </a:lnSpc>
+              <a:buFont typeface="Wingdings" panose="05000000000000000000" pitchFamily="2" charset="2"/>
+              <a:buChar char="§"/>
+            </a:pPr>
+            <a:r>
+              <a:rPr lang="pt-PT" dirty="0" err="1">
+                <a:latin typeface="Kozuka Gothic Pro R" panose="020B0400000000000000" pitchFamily="34" charset="-128"/>
+                <a:ea typeface="Kozuka Gothic Pro R" panose="020B0400000000000000" pitchFamily="34" charset="-128"/>
+              </a:rPr>
+              <a:t>Feed</a:t>
+            </a:r>
+            <a:r>
+              <a:rPr lang="pt-PT" dirty="0">
+                <a:latin typeface="Kozuka Gothic Pro R" panose="020B0400000000000000" pitchFamily="34" charset="-128"/>
+                <a:ea typeface="Kozuka Gothic Pro R" panose="020B0400000000000000" pitchFamily="34" charset="-128"/>
+              </a:rPr>
+              <a:t> de últimos locais visitados pelos amigos</a:t>
+            </a:r>
+            <a:r>
+              <a:rPr lang="pt-PT" dirty="0" smtClean="0">
+                <a:latin typeface="Kozuka Gothic Pro R" panose="020B0400000000000000" pitchFamily="34" charset="-128"/>
+                <a:ea typeface="Kozuka Gothic Pro R" panose="020B0400000000000000" pitchFamily="34" charset="-128"/>
+              </a:rPr>
+              <a:t>;</a:t>
+            </a:r>
+          </a:p>
+          <a:p>
+            <a:pPr>
+              <a:lnSpc>
+                <a:spcPct val="200000"/>
+              </a:lnSpc>
+              <a:buFont typeface="Wingdings" panose="05000000000000000000" pitchFamily="2" charset="2"/>
+              <a:buChar char="§"/>
+            </a:pPr>
+            <a:r>
+              <a:rPr lang="pt-PT" dirty="0">
+                <a:latin typeface="Kozuka Gothic Pro R" panose="020B0400000000000000" pitchFamily="34" charset="-128"/>
+                <a:ea typeface="Kozuka Gothic Pro R" panose="020B0400000000000000" pitchFamily="34" charset="-128"/>
+              </a:rPr>
+              <a:t>Aceder às informações de um local pelo seu código QR</a:t>
+            </a:r>
+            <a:r>
+              <a:rPr lang="pt-PT" dirty="0" smtClean="0">
+                <a:latin typeface="Kozuka Gothic Pro R" panose="020B0400000000000000" pitchFamily="34" charset="-128"/>
+                <a:ea typeface="Kozuka Gothic Pro R" panose="020B0400000000000000" pitchFamily="34" charset="-128"/>
+              </a:rPr>
+              <a:t>;</a:t>
+            </a:r>
+          </a:p>
+          <a:p>
+            <a:pPr>
+              <a:lnSpc>
+                <a:spcPct val="200000"/>
+              </a:lnSpc>
+              <a:buFont typeface="Wingdings" panose="05000000000000000000" pitchFamily="2" charset="2"/>
+              <a:buChar char="§"/>
+            </a:pPr>
+            <a:r>
+              <a:rPr lang="pt-PT" dirty="0" smtClean="0">
+                <a:latin typeface="Kozuka Gothic Pro R" panose="020B0400000000000000" pitchFamily="34" charset="-128"/>
+                <a:ea typeface="Kozuka Gothic Pro R" panose="020B0400000000000000" pitchFamily="34" charset="-128"/>
+              </a:rPr>
+              <a:t>Integração com o </a:t>
+            </a:r>
+            <a:r>
+              <a:rPr lang="pt-PT" dirty="0" err="1" smtClean="0">
+                <a:latin typeface="Kozuka Gothic Pro R" panose="020B0400000000000000" pitchFamily="34" charset="-128"/>
+                <a:ea typeface="Kozuka Gothic Pro R" panose="020B0400000000000000" pitchFamily="34" charset="-128"/>
+              </a:rPr>
+              <a:t>Facebook</a:t>
+            </a:r>
+            <a:r>
+              <a:rPr lang="pt-PT" dirty="0" smtClean="0">
+                <a:latin typeface="Kozuka Gothic Pro R" panose="020B0400000000000000" pitchFamily="34" charset="-128"/>
+                <a:ea typeface="Kozuka Gothic Pro R" panose="020B0400000000000000" pitchFamily="34" charset="-128"/>
+              </a:rPr>
+              <a:t>.</a:t>
+            </a:r>
+            <a:endParaRPr lang="pt-PT" dirty="0">
+              <a:latin typeface="Kozuka Gothic Pro R" panose="020B0400000000000000" pitchFamily="34" charset="-128"/>
+              <a:ea typeface="Kozuka Gothic Pro R" panose="020B0400000000000000" pitchFamily="34" charset="-128"/>
+            </a:endParaRPr>
+          </a:p>
+          <a:p>
+            <a:pPr>
+              <a:lnSpc>
+                <a:spcPct val="200000"/>
+              </a:lnSpc>
+              <a:buFont typeface="Wingdings" panose="05000000000000000000" pitchFamily="2" charset="2"/>
+              <a:buChar char="§"/>
+            </a:pPr>
+            <a:endParaRPr lang="pt-PT" dirty="0" smtClean="0">
+              <a:latin typeface="Kozuka Gothic Pro R" panose="020B0400000000000000" pitchFamily="34" charset="-128"/>
+              <a:ea typeface="Kozuka Gothic Pro R" panose="020B0400000000000000" pitchFamily="34" charset="-128"/>
+            </a:endParaRPr>
+          </a:p>
+        </p:txBody>
+      </p:sp>
+      <p:sp>
+        <p:nvSpPr>
+          <p:cNvPr id="5" name="Título 1"/>
+          <p:cNvSpPr txBox="1">
+            <a:spLocks/>
+          </p:cNvSpPr>
+          <p:nvPr/>
+        </p:nvSpPr>
+        <p:spPr>
+          <a:xfrm>
+            <a:off x="838200" y="299221"/>
+            <a:ext cx="10515600" cy="1325563"/>
+          </a:xfrm>
+          <a:prstGeom prst="rect">
+            <a:avLst/>
+          </a:prstGeom>
+        </p:spPr>
+        <p:txBody>
+          <a:bodyPr vert="horz" lIns="91440" tIns="45720" rIns="91440" bIns="45720" rtlCol="0" anchor="ctr">
+            <a:normAutofit/>
+          </a:bodyPr>
+          <a:lstStyle>
+            <a:lvl1pPr algn="l" defTabSz="914400" rtl="0" eaLnBrk="1" latinLnBrk="0" hangingPunct="1">
+              <a:lnSpc>
+                <a:spcPct val="90000"/>
+              </a:lnSpc>
+              <a:spcBef>
+                <a:spcPct val="0"/>
+              </a:spcBef>
+              <a:buNone/>
+              <a:defRPr sz="4400" kern="1200">
+                <a:solidFill>
+                  <a:schemeClr val="tx1"/>
+                </a:solidFill>
+                <a:latin typeface="+mj-lt"/>
+                <a:ea typeface="+mj-ea"/>
+                <a:cs typeface="+mj-cs"/>
+              </a:defRPr>
+            </a:lvl1pPr>
+          </a:lstStyle>
+          <a:p>
+            <a:pPr algn="r"/>
+            <a:r>
+              <a:rPr lang="pt-PT" b="1" dirty="0" smtClean="0">
+                <a:latin typeface="Kozuka Gothic Pr6N B" panose="020B0800000000000000" pitchFamily="34" charset="-128"/>
+                <a:ea typeface="Kozuka Gothic Pr6N B" panose="020B0800000000000000" pitchFamily="34" charset="-128"/>
+              </a:rPr>
+              <a:t>Funcionalidades</a:t>
+            </a:r>
+            <a:endParaRPr lang="pt-PT" b="1" dirty="0">
+              <a:latin typeface="Kozuka Gothic Pr6N B" panose="020B0800000000000000" pitchFamily="34" charset="-128"/>
+              <a:ea typeface="Kozuka Gothic Pr6N B" panose="020B0800000000000000" pitchFamily="34" charset="-128"/>
+            </a:endParaRPr>
+          </a:p>
+        </p:txBody>
+      </p:sp>
+      <p:sp>
+        <p:nvSpPr>
+          <p:cNvPr id="6" name="Marcador de Posição de Conteúdo 2"/>
+          <p:cNvSpPr txBox="1">
+            <a:spLocks/>
+          </p:cNvSpPr>
+          <p:nvPr/>
+        </p:nvSpPr>
+        <p:spPr>
+          <a:xfrm>
+            <a:off x="838200" y="1063625"/>
+            <a:ext cx="2316892" cy="1111164"/>
+          </a:xfrm>
+          <a:prstGeom prst="rect">
+            <a:avLst/>
+          </a:prstGeom>
+        </p:spPr>
+        <p:txBody>
+          <a:bodyPr vert="horz" lIns="91440" tIns="45720" rIns="91440" bIns="45720" rtlCol="0">
+            <a:noAutofit/>
+          </a:bodyPr>
+          <a:lstStyle>
+            <a:lvl1pPr marL="228600" indent="-228600" algn="l" defTabSz="914400" rtl="0" eaLnBrk="1" latinLnBrk="0" hangingPunct="1">
+              <a:lnSpc>
+                <a:spcPct val="90000"/>
+              </a:lnSpc>
+              <a:spcBef>
+                <a:spcPts val="1000"/>
+              </a:spcBef>
+              <a:buFont typeface="Arial" panose="020B0604020202020204" pitchFamily="34" charset="0"/>
+              <a:buChar char="•"/>
+              <a:defRPr sz="2800" kern="1200">
+                <a:solidFill>
+                  <a:schemeClr val="tx1"/>
+                </a:solidFill>
+                <a:latin typeface="+mn-lt"/>
+                <a:ea typeface="+mn-ea"/>
+                <a:cs typeface="+mn-cs"/>
+              </a:defRPr>
+            </a:lvl1pPr>
+            <a:lvl2pPr marL="685800" indent="-228600" algn="l" defTabSz="914400" rtl="0" eaLnBrk="1" latinLnBrk="0" hangingPunct="1">
+              <a:lnSpc>
+                <a:spcPct val="90000"/>
+              </a:lnSpc>
+              <a:spcBef>
+                <a:spcPts val="500"/>
+              </a:spcBef>
+              <a:buFont typeface="Arial" panose="020B0604020202020204" pitchFamily="34" charset="0"/>
+              <a:buChar char="•"/>
+              <a:defRPr sz="2400" kern="1200">
+                <a:solidFill>
+                  <a:schemeClr val="tx1"/>
+                </a:solidFill>
+                <a:latin typeface="+mn-lt"/>
+                <a:ea typeface="+mn-ea"/>
+                <a:cs typeface="+mn-cs"/>
+              </a:defRPr>
+            </a:lvl2pPr>
+            <a:lvl3pPr marL="1143000" indent="-228600" algn="l" defTabSz="914400" rtl="0" eaLnBrk="1" latinLnBrk="0" hangingPunct="1">
+              <a:lnSpc>
+                <a:spcPct val="90000"/>
+              </a:lnSpc>
+              <a:spcBef>
+                <a:spcPts val="500"/>
+              </a:spcBef>
+              <a:buFont typeface="Arial" panose="020B0604020202020204" pitchFamily="34" charset="0"/>
+              <a:buChar char="•"/>
+              <a:defRPr sz="2000" kern="1200">
+                <a:solidFill>
+                  <a:schemeClr val="tx1"/>
+                </a:solidFill>
+                <a:latin typeface="+mn-lt"/>
+                <a:ea typeface="+mn-ea"/>
+                <a:cs typeface="+mn-cs"/>
+              </a:defRPr>
+            </a:lvl3pPr>
+            <a:lvl4pPr marL="1600200" indent="-228600" algn="l" defTabSz="914400" rtl="0" eaLnBrk="1" latinLnBrk="0" hangingPunct="1">
+              <a:lnSpc>
+                <a:spcPct val="90000"/>
+              </a:lnSpc>
+              <a:spcBef>
+                <a:spcPts val="500"/>
+              </a:spcBef>
+              <a:buFont typeface="Arial" panose="020B0604020202020204" pitchFamily="34" charset="0"/>
+              <a:buChar char="•"/>
+              <a:defRPr sz="1800" kern="1200">
+                <a:solidFill>
+                  <a:schemeClr val="tx1"/>
+                </a:solidFill>
+                <a:latin typeface="+mn-lt"/>
+                <a:ea typeface="+mn-ea"/>
+                <a:cs typeface="+mn-cs"/>
+              </a:defRPr>
+            </a:lvl4pPr>
+            <a:lvl5pPr marL="2057400" indent="-228600" algn="l" defTabSz="914400" rtl="0" eaLnBrk="1" latinLnBrk="0" hangingPunct="1">
+              <a:lnSpc>
+                <a:spcPct val="90000"/>
+              </a:lnSpc>
+              <a:spcBef>
+                <a:spcPts val="500"/>
+              </a:spcBef>
+              <a:buFont typeface="Arial" panose="020B0604020202020204" pitchFamily="34" charset="0"/>
+              <a:buChar char="•"/>
+              <a:defRPr sz="1800" kern="1200">
+                <a:solidFill>
+                  <a:schemeClr val="tx1"/>
+                </a:solidFill>
+                <a:latin typeface="+mn-lt"/>
+                <a:ea typeface="+mn-ea"/>
+                <a:cs typeface="+mn-cs"/>
+              </a:defRPr>
+            </a:lvl5pPr>
+            <a:lvl6pPr marL="2514600" indent="-228600" algn="l" defTabSz="914400" rtl="0" eaLnBrk="1" latinLnBrk="0" hangingPunct="1">
+              <a:lnSpc>
+                <a:spcPct val="90000"/>
+              </a:lnSpc>
+              <a:spcBef>
+                <a:spcPts val="500"/>
+              </a:spcBef>
+              <a:buFont typeface="Arial" panose="020B0604020202020204" pitchFamily="34" charset="0"/>
+              <a:buChar char="•"/>
+              <a:defRPr sz="1800" kern="1200">
+                <a:solidFill>
+                  <a:schemeClr val="tx1"/>
+                </a:solidFill>
+                <a:latin typeface="+mn-lt"/>
+                <a:ea typeface="+mn-ea"/>
+                <a:cs typeface="+mn-cs"/>
+              </a:defRPr>
+            </a:lvl6pPr>
+            <a:lvl7pPr marL="2971800" indent="-228600" algn="l" defTabSz="914400" rtl="0" eaLnBrk="1" latinLnBrk="0" hangingPunct="1">
+              <a:lnSpc>
+                <a:spcPct val="90000"/>
+              </a:lnSpc>
+              <a:spcBef>
+                <a:spcPts val="500"/>
+              </a:spcBef>
+              <a:buFont typeface="Arial" panose="020B0604020202020204" pitchFamily="34" charset="0"/>
+              <a:buChar char="•"/>
+              <a:defRPr sz="1800" kern="1200">
+                <a:solidFill>
+                  <a:schemeClr val="tx1"/>
+                </a:solidFill>
+                <a:latin typeface="+mn-lt"/>
+                <a:ea typeface="+mn-ea"/>
+                <a:cs typeface="+mn-cs"/>
+              </a:defRPr>
+            </a:lvl7pPr>
+            <a:lvl8pPr marL="3429000" indent="-228600" algn="l" defTabSz="914400" rtl="0" eaLnBrk="1" latinLnBrk="0" hangingPunct="1">
+              <a:lnSpc>
+                <a:spcPct val="90000"/>
+              </a:lnSpc>
+              <a:spcBef>
+                <a:spcPts val="500"/>
+              </a:spcBef>
+              <a:buFont typeface="Arial" panose="020B0604020202020204" pitchFamily="34" charset="0"/>
+              <a:buChar char="•"/>
+              <a:defRPr sz="1800" kern="1200">
+                <a:solidFill>
+                  <a:schemeClr val="tx1"/>
+                </a:solidFill>
+                <a:latin typeface="+mn-lt"/>
+                <a:ea typeface="+mn-ea"/>
+                <a:cs typeface="+mn-cs"/>
+              </a:defRPr>
+            </a:lvl8pPr>
+            <a:lvl9pPr marL="3886200" indent="-228600" algn="l" defTabSz="914400" rtl="0" eaLnBrk="1" latinLnBrk="0" hangingPunct="1">
+              <a:lnSpc>
+                <a:spcPct val="90000"/>
+              </a:lnSpc>
+              <a:spcBef>
+                <a:spcPts val="500"/>
+              </a:spcBef>
+              <a:buFont typeface="Arial" panose="020B0604020202020204" pitchFamily="34" charset="0"/>
+              <a:buChar char="•"/>
+              <a:defRPr sz="1800" kern="1200">
+                <a:solidFill>
+                  <a:schemeClr val="tx1"/>
+                </a:solidFill>
+                <a:latin typeface="+mn-lt"/>
+                <a:ea typeface="+mn-ea"/>
+                <a:cs typeface="+mn-cs"/>
+              </a:defRPr>
+            </a:lvl9pPr>
+          </a:lstStyle>
+          <a:p>
+            <a:pPr marL="0" indent="0">
+              <a:lnSpc>
+                <a:spcPct val="200000"/>
+              </a:lnSpc>
+              <a:buFont typeface="Arial" panose="020B0604020202020204" pitchFamily="34" charset="0"/>
+              <a:buNone/>
+            </a:pPr>
+            <a:r>
+              <a:rPr lang="pt-PT" sz="3200" b="1" dirty="0" smtClean="0">
+                <a:latin typeface="Kozuka Gothic Pro R" panose="020B0400000000000000" pitchFamily="34" charset="-128"/>
+                <a:ea typeface="Kozuka Gothic Pro R" panose="020B0400000000000000" pitchFamily="34" charset="-128"/>
+              </a:rPr>
+              <a:t>ANDROID</a:t>
+            </a:r>
+            <a:endParaRPr lang="pt-PT" dirty="0" smtClean="0">
+              <a:latin typeface="Kozuka Gothic Pro R" panose="020B0400000000000000" pitchFamily="34" charset="-128"/>
+              <a:ea typeface="Kozuka Gothic Pro R" panose="020B0400000000000000" pitchFamily="34" charset="-128"/>
+            </a:endParaRPr>
+          </a:p>
+        </p:txBody>
+      </p:sp>
+    </p:spTree>
+    <p:extLst>
+      <p:ext uri="{BB962C8B-B14F-4D97-AF65-F5344CB8AC3E}">
+        <p14:creationId xmlns:p14="http://schemas.microsoft.com/office/powerpoint/2010/main" val="487377577"/>
+      </p:ext>
+    </p:extLst>
+  </p:cSld>
+  <p:clrMapOvr>
+    <a:masterClrMapping/>
+  </p:clrMapOvr>
+  <p:timing>
+    <p:tnLst>
+      <p:par>
+        <p:cTn id="1" dur="indefinite" restart="never" nodeType="tmRoot"/>
+      </p:par>
+    </p:tnLst>
+  </p:timing>
+</p:sld>
+</file>
+
+<file path=ppt/slides/slide6.xml><?xml version="1.0" encoding="utf-8"?>
+<p:sld xmlns:a="http://schemas.openxmlformats.org/drawingml/2006/main" xmlns:r="http://schemas.openxmlformats.org/officeDocument/2006/relationships" xmlns:p="http://schemas.openxmlformats.org/presentationml/2006/main">
+  <p:cSld>
+    <p:spTree>
+      <p:nvGrpSpPr>
+        <p:cNvPr id="1" name=""/>
+        <p:cNvGrpSpPr/>
+        <p:nvPr/>
+      </p:nvGrpSpPr>
+      <p:grpSpPr>
+        <a:xfrm>
+          <a:off x="0" y="0"/>
+          <a:ext cx="0" cy="0"/>
+          <a:chOff x="0" y="0"/>
+          <a:chExt cx="0" cy="0"/>
+        </a:xfrm>
+      </p:grpSpPr>
+      <p:pic>
+        <p:nvPicPr>
+          <p:cNvPr id="4" name="Imagem 3"/>
+          <p:cNvPicPr>
+            <a:picLocks noChangeAspect="1"/>
+          </p:cNvPicPr>
+          <p:nvPr/>
+        </p:nvPicPr>
+        <p:blipFill>
+          <a:blip r:embed="rId2">
+            <a:extLst>
+              <a:ext uri="{28A0092B-C50C-407E-A947-70E740481C1C}">
+                <a14:useLocalDpi xmlns:a14="http://schemas.microsoft.com/office/drawing/2010/main" val="0"/>
+              </a:ext>
+            </a:extLst>
+          </a:blip>
+          <a:stretch>
+            <a:fillRect/>
+          </a:stretch>
+        </p:blipFill>
+        <p:spPr>
+          <a:xfrm>
+            <a:off x="0" y="0"/>
+            <a:ext cx="12192000" cy="6858000"/>
+          </a:xfrm>
+          <a:prstGeom prst="rect">
+            <a:avLst/>
+          </a:prstGeom>
+        </p:spPr>
+      </p:pic>
+      <p:sp>
+        <p:nvSpPr>
+          <p:cNvPr id="3" name="Marcador de Posição de Conteúdo 2"/>
+          <p:cNvSpPr>
+            <a:spLocks noGrp="1"/>
+          </p:cNvSpPr>
+          <p:nvPr>
+            <p:ph idx="1"/>
+          </p:nvPr>
+        </p:nvSpPr>
+        <p:spPr/>
+        <p:txBody>
+          <a:bodyPr/>
+          <a:lstStyle/>
+          <a:p>
+            <a:pPr>
+              <a:lnSpc>
+                <a:spcPct val="200000"/>
+              </a:lnSpc>
+              <a:buFont typeface="Wingdings" panose="05000000000000000000" pitchFamily="2" charset="2"/>
+              <a:buChar char="§"/>
+            </a:pPr>
+            <a:r>
+              <a:rPr lang="pt-PT" dirty="0" smtClean="0">
+                <a:latin typeface="Kozuka Gothic Pro R" panose="020B0400000000000000" pitchFamily="34" charset="-128"/>
+                <a:ea typeface="Kozuka Gothic Pro R" panose="020B0400000000000000" pitchFamily="34" charset="-128"/>
+              </a:rPr>
+              <a:t>Estender para o resto das cidades de </a:t>
+            </a:r>
+            <a:r>
+              <a:rPr lang="pt-PT" dirty="0" smtClean="0">
+                <a:latin typeface="Kozuka Gothic Pro R" panose="020B0400000000000000" pitchFamily="34" charset="-128"/>
+                <a:ea typeface="Kozuka Gothic Pro R" panose="020B0400000000000000" pitchFamily="34" charset="-128"/>
+              </a:rPr>
+              <a:t>Portugal</a:t>
+            </a:r>
+            <a:r>
+              <a:rPr lang="pt-PT" dirty="0" smtClean="0">
+                <a:latin typeface="Kozuka Gothic Pro R" panose="020B0400000000000000" pitchFamily="34" charset="-128"/>
+                <a:ea typeface="Kozuka Gothic Pro R" panose="020B0400000000000000" pitchFamily="34" charset="-128"/>
+              </a:rPr>
+              <a:t>;</a:t>
+            </a:r>
+            <a:endParaRPr lang="pt-PT" dirty="0" smtClean="0">
+              <a:latin typeface="Kozuka Gothic Pro R" panose="020B0400000000000000" pitchFamily="34" charset="-128"/>
+              <a:ea typeface="Kozuka Gothic Pro R" panose="020B0400000000000000" pitchFamily="34" charset="-128"/>
+            </a:endParaRPr>
+          </a:p>
+          <a:p>
+            <a:pPr>
+              <a:lnSpc>
+                <a:spcPct val="200000"/>
+              </a:lnSpc>
+              <a:buFont typeface="Wingdings" panose="05000000000000000000" pitchFamily="2" charset="2"/>
+              <a:buChar char="§"/>
+            </a:pPr>
+            <a:r>
+              <a:rPr lang="pt-PT" dirty="0" smtClean="0">
+                <a:latin typeface="Kozuka Gothic Pro R" panose="020B0400000000000000" pitchFamily="34" charset="-128"/>
+                <a:ea typeface="Kozuka Gothic Pro R" panose="020B0400000000000000" pitchFamily="34" charset="-128"/>
+              </a:rPr>
+              <a:t>Fornecer as sugestões de </a:t>
+            </a:r>
+            <a:r>
+              <a:rPr lang="pt-PT" dirty="0" err="1" smtClean="0">
+                <a:latin typeface="Kozuka Gothic Pro R" panose="020B0400000000000000" pitchFamily="34" charset="-128"/>
+                <a:ea typeface="Kozuka Gothic Pro R" panose="020B0400000000000000" pitchFamily="34" charset="-128"/>
+              </a:rPr>
+              <a:t>PoI’s</a:t>
+            </a:r>
+            <a:r>
+              <a:rPr lang="pt-PT" dirty="0" smtClean="0">
+                <a:latin typeface="Kozuka Gothic Pro R" panose="020B0400000000000000" pitchFamily="34" charset="-128"/>
+                <a:ea typeface="Kozuka Gothic Pro R" panose="020B0400000000000000" pitchFamily="34" charset="-128"/>
+              </a:rPr>
+              <a:t> também no website;</a:t>
+            </a:r>
+          </a:p>
+          <a:p>
+            <a:pPr>
+              <a:lnSpc>
+                <a:spcPct val="200000"/>
+              </a:lnSpc>
+              <a:buFont typeface="Wingdings" panose="05000000000000000000" pitchFamily="2" charset="2"/>
+              <a:buChar char="§"/>
+            </a:pPr>
+            <a:r>
+              <a:rPr lang="pt-PT" dirty="0" smtClean="0">
+                <a:latin typeface="Kozuka Gothic Pro R" panose="020B0400000000000000" pitchFamily="34" charset="-128"/>
+                <a:ea typeface="Kozuka Gothic Pro R" panose="020B0400000000000000" pitchFamily="34" charset="-128"/>
+              </a:rPr>
+              <a:t>Multi-idioma.</a:t>
+            </a:r>
+          </a:p>
+        </p:txBody>
+      </p:sp>
+      <p:sp>
+        <p:nvSpPr>
+          <p:cNvPr id="5" name="Título 1"/>
+          <p:cNvSpPr txBox="1">
+            <a:spLocks/>
+          </p:cNvSpPr>
+          <p:nvPr/>
+        </p:nvSpPr>
+        <p:spPr>
+          <a:xfrm>
+            <a:off x="838200" y="299221"/>
+            <a:ext cx="10515600" cy="1325563"/>
+          </a:xfrm>
+          <a:prstGeom prst="rect">
+            <a:avLst/>
+          </a:prstGeom>
+        </p:spPr>
+        <p:txBody>
+          <a:bodyPr vert="horz" lIns="91440" tIns="45720" rIns="91440" bIns="45720" rtlCol="0" anchor="ctr">
+            <a:normAutofit/>
+          </a:bodyPr>
+          <a:lstStyle>
+            <a:lvl1pPr algn="l" defTabSz="914400" rtl="0" eaLnBrk="1" latinLnBrk="0" hangingPunct="1">
+              <a:lnSpc>
+                <a:spcPct val="90000"/>
+              </a:lnSpc>
+              <a:spcBef>
+                <a:spcPct val="0"/>
+              </a:spcBef>
+              <a:buNone/>
+              <a:defRPr sz="4400" kern="1200">
+                <a:solidFill>
+                  <a:schemeClr val="tx1"/>
+                </a:solidFill>
+                <a:latin typeface="+mj-lt"/>
+                <a:ea typeface="+mj-ea"/>
+                <a:cs typeface="+mj-cs"/>
+              </a:defRPr>
+            </a:lvl1pPr>
+          </a:lstStyle>
+          <a:p>
+            <a:pPr algn="r"/>
+            <a:r>
+              <a:rPr lang="pt-PT" b="1" dirty="0" smtClean="0">
+                <a:latin typeface="Kozuka Gothic Pr6N B" panose="020B0800000000000000" pitchFamily="34" charset="-128"/>
+                <a:ea typeface="Kozuka Gothic Pr6N B" panose="020B0800000000000000" pitchFamily="34" charset="-128"/>
+              </a:rPr>
               <a:t>Visão</a:t>
             </a:r>
-            <a:endParaRPr lang="pt-PT" dirty="0"/>
-          </a:p>
-        </p:txBody>
-      </p:sp>
-      <p:sp>
-        <p:nvSpPr>
-          <p:cNvPr id="3" name="Marcador de Posição de Conteúdo 2"/>
-          <p:cNvSpPr>
-            <a:spLocks noGrp="1"/>
-          </p:cNvSpPr>
-          <p:nvPr>
-            <p:ph idx="1"/>
-          </p:nvPr>
-        </p:nvSpPr>
-        <p:spPr/>
-        <p:txBody>
-          <a:bodyPr/>
-          <a:lstStyle/>
-          <a:p>
-            <a:r>
-              <a:rPr lang="pt-PT" smtClean="0"/>
-              <a:t>Estender para </a:t>
-            </a:r>
-            <a:r>
-              <a:rPr lang="pt-PT" dirty="0" smtClean="0"/>
-              <a:t>o resto das cidades de Portugal.</a:t>
-            </a:r>
-            <a:endParaRPr lang="pt-PT" dirty="0"/>
+            <a:endParaRPr lang="pt-PT" b="1" dirty="0">
+              <a:latin typeface="Kozuka Gothic Pr6N B" panose="020B0800000000000000" pitchFamily="34" charset="-128"/>
+              <a:ea typeface="Kozuka Gothic Pr6N B" panose="020B0800000000000000" pitchFamily="34" charset="-128"/>
+            </a:endParaRPr>
           </a:p>
         </p:txBody>
       </p:sp>
@@ -3486,6 +4586,13 @@
   <p:clrMapOvr>
     <a:masterClrMapping/>
   </p:clrMapOvr>
+  <p:timing>
+    <p:tnLst>
+      <p:par>
+        <p:cTn id="1" dur="indefinite" restart="never" nodeType="tmRoot"/>
+      </p:par>
+    </p:tnLst>
+  </p:timing>
 </p:sld>
 </file>
 

</xml_diff>